<commit_message>
Added the answers at the end
</commit_message>
<xml_diff>
--- a/Presentations/PPC_Lesson06_Delegates.pptx
+++ b/Presentations/PPC_Lesson06_Delegates.pptx
@@ -5,7 +5,7 @@
     <p:sldMasterId id="2147483648" r:id="rId1"/>
   </p:sldMasterIdLst>
   <p:notesMasterIdLst>
-    <p:notesMasterId r:id="rId15"/>
+    <p:notesMasterId r:id="rId17"/>
   </p:notesMasterIdLst>
   <p:sldIdLst>
     <p:sldId id="256" r:id="rId2"/>
@@ -21,6 +21,8 @@
     <p:sldId id="276" r:id="rId12"/>
     <p:sldId id="264" r:id="rId13"/>
     <p:sldId id="277" r:id="rId14"/>
+    <p:sldId id="280" r:id="rId15"/>
+    <p:sldId id="279" r:id="rId16"/>
   </p:sldIdLst>
   <p:sldSz cx="12192000" cy="6858000"/>
   <p:notesSz cx="6858000" cy="9144000"/>
@@ -209,7 +211,7 @@
           <a:p>
             <a:fld id="{EADAD8EF-121A-4DA9-8F56-3CF83EF2424F}" type="datetimeFigureOut">
               <a:rPr lang="en-US" smtClean="0"/>
-              <a:t>1/14/2016</a:t>
+              <a:t>1/15/2016</a:t>
             </a:fld>
             <a:endParaRPr lang="en-US"/>
           </a:p>
@@ -561,6 +563,238 @@
 </p:notes>
 </file>
 
+<file path=ppt/notesSlides/notesSlide10.xml><?xml version="1.0" encoding="utf-8"?>
+<p:notes xmlns:a="http://schemas.openxmlformats.org/drawingml/2006/main" xmlns:r="http://schemas.openxmlformats.org/officeDocument/2006/relationships" xmlns:p="http://schemas.openxmlformats.org/presentationml/2006/main">
+  <p:cSld>
+    <p:spTree>
+      <p:nvGrpSpPr>
+        <p:cNvPr id="1" name=""/>
+        <p:cNvGrpSpPr/>
+        <p:nvPr/>
+      </p:nvGrpSpPr>
+      <p:grpSpPr>
+        <a:xfrm>
+          <a:off x="0" y="0"/>
+          <a:ext cx="0" cy="0"/>
+          <a:chOff x="0" y="0"/>
+          <a:chExt cx="0" cy="0"/>
+        </a:xfrm>
+      </p:grpSpPr>
+      <p:sp>
+        <p:nvSpPr>
+          <p:cNvPr id="2" name="Tijdelijke aanduiding voor dia-afbeelding 1"/>
+          <p:cNvSpPr>
+            <a:spLocks noGrp="1" noRot="1" noChangeAspect="1"/>
+          </p:cNvSpPr>
+          <p:nvPr>
+            <p:ph type="sldImg"/>
+          </p:nvPr>
+        </p:nvSpPr>
+        <p:spPr/>
+      </p:sp>
+      <p:sp>
+        <p:nvSpPr>
+          <p:cNvPr id="3" name="Tijdelijke aanduiding voor notities 2"/>
+          <p:cNvSpPr>
+            <a:spLocks noGrp="1"/>
+          </p:cNvSpPr>
+          <p:nvPr>
+            <p:ph type="body" idx="1"/>
+          </p:nvPr>
+        </p:nvSpPr>
+        <p:spPr/>
+        <p:txBody>
+          <a:bodyPr/>
+          <a:lstStyle/>
+          <a:p>
+            <a:r>
+              <a:rPr lang="nl-NL" dirty="0" smtClean="0"/>
+              <a:t>Code beheert</a:t>
+            </a:r>
+            <a:r>
+              <a:rPr lang="nl-NL" baseline="0" dirty="0" smtClean="0"/>
+              <a:t> zichzelf!</a:t>
+            </a:r>
+          </a:p>
+          <a:p>
+            <a:r>
+              <a:rPr lang="nl-NL" baseline="0" dirty="0" smtClean="0"/>
+              <a:t>Voorbeeld:</a:t>
+            </a:r>
+          </a:p>
+          <a:p>
+            <a:r>
+              <a:rPr lang="nl-NL" baseline="0" dirty="0" smtClean="0"/>
+              <a:t>Grote stad, allemaal winkels, brandweer, politie.</a:t>
+            </a:r>
+          </a:p>
+          <a:p>
+            <a:r>
+              <a:rPr lang="nl-NL" baseline="0" dirty="0" smtClean="0"/>
+              <a:t>Kat in de boom, dan komt de brandweer van pas.</a:t>
+            </a:r>
+          </a:p>
+          <a:p>
+            <a:r>
+              <a:rPr lang="nl-NL" baseline="0" dirty="0" smtClean="0"/>
+              <a:t>Brandweer hoeft niet constant op de kat te letten.</a:t>
+            </a:r>
+            <a:endParaRPr lang="en-US" dirty="0"/>
+          </a:p>
+        </p:txBody>
+      </p:sp>
+      <p:sp>
+        <p:nvSpPr>
+          <p:cNvPr id="4" name="Tijdelijke aanduiding voor dianummer 3"/>
+          <p:cNvSpPr>
+            <a:spLocks noGrp="1"/>
+          </p:cNvSpPr>
+          <p:nvPr>
+            <p:ph type="sldNum" sz="quarter" idx="10"/>
+          </p:nvPr>
+        </p:nvSpPr>
+        <p:spPr/>
+        <p:txBody>
+          <a:bodyPr/>
+          <a:lstStyle/>
+          <a:p>
+            <a:fld id="{CEDD8575-EA7E-4817-B2E5-52B3AEB85567}" type="slidenum">
+              <a:rPr lang="en-US" smtClean="0"/>
+              <a:t>14</a:t>
+            </a:fld>
+            <a:endParaRPr lang="en-US"/>
+          </a:p>
+        </p:txBody>
+      </p:sp>
+    </p:spTree>
+    <p:extLst>
+      <p:ext uri="{BB962C8B-B14F-4D97-AF65-F5344CB8AC3E}">
+        <p14:creationId xmlns:p14="http://schemas.microsoft.com/office/powerpoint/2010/main" val="73115766"/>
+      </p:ext>
+    </p:extLst>
+  </p:cSld>
+  <p:clrMapOvr>
+    <a:masterClrMapping/>
+  </p:clrMapOvr>
+</p:notes>
+</file>
+
+<file path=ppt/notesSlides/notesSlide11.xml><?xml version="1.0" encoding="utf-8"?>
+<p:notes xmlns:a="http://schemas.openxmlformats.org/drawingml/2006/main" xmlns:r="http://schemas.openxmlformats.org/officeDocument/2006/relationships" xmlns:p="http://schemas.openxmlformats.org/presentationml/2006/main">
+  <p:cSld>
+    <p:spTree>
+      <p:nvGrpSpPr>
+        <p:cNvPr id="1" name=""/>
+        <p:cNvGrpSpPr/>
+        <p:nvPr/>
+      </p:nvGrpSpPr>
+      <p:grpSpPr>
+        <a:xfrm>
+          <a:off x="0" y="0"/>
+          <a:ext cx="0" cy="0"/>
+          <a:chOff x="0" y="0"/>
+          <a:chExt cx="0" cy="0"/>
+        </a:xfrm>
+      </p:grpSpPr>
+      <p:sp>
+        <p:nvSpPr>
+          <p:cNvPr id="2" name="Tijdelijke aanduiding voor dia-afbeelding 1"/>
+          <p:cNvSpPr>
+            <a:spLocks noGrp="1" noRot="1" noChangeAspect="1"/>
+          </p:cNvSpPr>
+          <p:nvPr>
+            <p:ph type="sldImg"/>
+          </p:nvPr>
+        </p:nvSpPr>
+        <p:spPr/>
+      </p:sp>
+      <p:sp>
+        <p:nvSpPr>
+          <p:cNvPr id="3" name="Tijdelijke aanduiding voor notities 2"/>
+          <p:cNvSpPr>
+            <a:spLocks noGrp="1"/>
+          </p:cNvSpPr>
+          <p:nvPr>
+            <p:ph type="body" idx="1"/>
+          </p:nvPr>
+        </p:nvSpPr>
+        <p:spPr/>
+        <p:txBody>
+          <a:bodyPr/>
+          <a:lstStyle/>
+          <a:p>
+            <a:r>
+              <a:rPr lang="nl-NL" dirty="0" smtClean="0"/>
+              <a:t>Code beheert</a:t>
+            </a:r>
+            <a:r>
+              <a:rPr lang="nl-NL" baseline="0" dirty="0" smtClean="0"/>
+              <a:t> zichzelf!</a:t>
+            </a:r>
+          </a:p>
+          <a:p>
+            <a:r>
+              <a:rPr lang="nl-NL" baseline="0" dirty="0" smtClean="0"/>
+              <a:t>Voorbeeld:</a:t>
+            </a:r>
+          </a:p>
+          <a:p>
+            <a:r>
+              <a:rPr lang="nl-NL" baseline="0" dirty="0" smtClean="0"/>
+              <a:t>Grote stad, allemaal winkels, brandweer, politie.</a:t>
+            </a:r>
+          </a:p>
+          <a:p>
+            <a:r>
+              <a:rPr lang="nl-NL" baseline="0" dirty="0" smtClean="0"/>
+              <a:t>Kat in de boom, dan komt de brandweer van pas.</a:t>
+            </a:r>
+          </a:p>
+          <a:p>
+            <a:r>
+              <a:rPr lang="nl-NL" baseline="0" dirty="0" smtClean="0"/>
+              <a:t>Brandweer hoeft niet constant op de kat te letten.</a:t>
+            </a:r>
+            <a:endParaRPr lang="en-US" dirty="0"/>
+          </a:p>
+        </p:txBody>
+      </p:sp>
+      <p:sp>
+        <p:nvSpPr>
+          <p:cNvPr id="4" name="Tijdelijke aanduiding voor dianummer 3"/>
+          <p:cNvSpPr>
+            <a:spLocks noGrp="1"/>
+          </p:cNvSpPr>
+          <p:nvPr>
+            <p:ph type="sldNum" sz="quarter" idx="10"/>
+          </p:nvPr>
+        </p:nvSpPr>
+        <p:spPr/>
+        <p:txBody>
+          <a:bodyPr/>
+          <a:lstStyle/>
+          <a:p>
+            <a:fld id="{CEDD8575-EA7E-4817-B2E5-52B3AEB85567}" type="slidenum">
+              <a:rPr lang="en-US" smtClean="0"/>
+              <a:t>15</a:t>
+            </a:fld>
+            <a:endParaRPr lang="en-US"/>
+          </a:p>
+        </p:txBody>
+      </p:sp>
+    </p:spTree>
+    <p:extLst>
+      <p:ext uri="{BB962C8B-B14F-4D97-AF65-F5344CB8AC3E}">
+        <p14:creationId xmlns:p14="http://schemas.microsoft.com/office/powerpoint/2010/main" val="1100545534"/>
+      </p:ext>
+    </p:extLst>
+  </p:cSld>
+  <p:clrMapOvr>
+    <a:masterClrMapping/>
+  </p:clrMapOvr>
+</p:notes>
+</file>
+
 <file path=ppt/notesSlides/notesSlide2.xml><?xml version="1.0" encoding="utf-8"?>
 <p:notes xmlns:a="http://schemas.openxmlformats.org/drawingml/2006/main" xmlns:r="http://schemas.openxmlformats.org/officeDocument/2006/relationships" xmlns:p="http://schemas.openxmlformats.org/presentationml/2006/main">
   <p:cSld>
@@ -1460,7 +1694,7 @@
           <a:p>
             <a:fld id="{F939DB40-1302-41AD-90AD-12D1D5337234}" type="datetimeFigureOut">
               <a:rPr lang="en-US" smtClean="0"/>
-              <a:t>1/14/2016</a:t>
+              <a:t>1/15/2016</a:t>
             </a:fld>
             <a:endParaRPr lang="en-US"/>
           </a:p>
@@ -1630,7 +1864,7 @@
           <a:p>
             <a:fld id="{F939DB40-1302-41AD-90AD-12D1D5337234}" type="datetimeFigureOut">
               <a:rPr lang="en-US" smtClean="0"/>
-              <a:t>1/14/2016</a:t>
+              <a:t>1/15/2016</a:t>
             </a:fld>
             <a:endParaRPr lang="en-US"/>
           </a:p>
@@ -1810,7 +2044,7 @@
           <a:p>
             <a:fld id="{F939DB40-1302-41AD-90AD-12D1D5337234}" type="datetimeFigureOut">
               <a:rPr lang="en-US" smtClean="0"/>
-              <a:t>1/14/2016</a:t>
+              <a:t>1/15/2016</a:t>
             </a:fld>
             <a:endParaRPr lang="en-US"/>
           </a:p>
@@ -1980,7 +2214,7 @@
           <a:p>
             <a:fld id="{F939DB40-1302-41AD-90AD-12D1D5337234}" type="datetimeFigureOut">
               <a:rPr lang="en-US" smtClean="0"/>
-              <a:t>1/14/2016</a:t>
+              <a:t>1/15/2016</a:t>
             </a:fld>
             <a:endParaRPr lang="en-US"/>
           </a:p>
@@ -2226,7 +2460,7 @@
           <a:p>
             <a:fld id="{F939DB40-1302-41AD-90AD-12D1D5337234}" type="datetimeFigureOut">
               <a:rPr lang="en-US" smtClean="0"/>
-              <a:t>1/14/2016</a:t>
+              <a:t>1/15/2016</a:t>
             </a:fld>
             <a:endParaRPr lang="en-US"/>
           </a:p>
@@ -2458,7 +2692,7 @@
           <a:p>
             <a:fld id="{F939DB40-1302-41AD-90AD-12D1D5337234}" type="datetimeFigureOut">
               <a:rPr lang="en-US" smtClean="0"/>
-              <a:t>1/14/2016</a:t>
+              <a:t>1/15/2016</a:t>
             </a:fld>
             <a:endParaRPr lang="en-US"/>
           </a:p>
@@ -2825,7 +3059,7 @@
           <a:p>
             <a:fld id="{F939DB40-1302-41AD-90AD-12D1D5337234}" type="datetimeFigureOut">
               <a:rPr lang="en-US" smtClean="0"/>
-              <a:t>1/14/2016</a:t>
+              <a:t>1/15/2016</a:t>
             </a:fld>
             <a:endParaRPr lang="en-US"/>
           </a:p>
@@ -2943,7 +3177,7 @@
           <a:p>
             <a:fld id="{F939DB40-1302-41AD-90AD-12D1D5337234}" type="datetimeFigureOut">
               <a:rPr lang="en-US" smtClean="0"/>
-              <a:t>1/14/2016</a:t>
+              <a:t>1/15/2016</a:t>
             </a:fld>
             <a:endParaRPr lang="en-US"/>
           </a:p>
@@ -3038,7 +3272,7 @@
           <a:p>
             <a:fld id="{F939DB40-1302-41AD-90AD-12D1D5337234}" type="datetimeFigureOut">
               <a:rPr lang="en-US" smtClean="0"/>
-              <a:t>1/14/2016</a:t>
+              <a:t>1/15/2016</a:t>
             </a:fld>
             <a:endParaRPr lang="en-US"/>
           </a:p>
@@ -3315,7 +3549,7 @@
           <a:p>
             <a:fld id="{F939DB40-1302-41AD-90AD-12D1D5337234}" type="datetimeFigureOut">
               <a:rPr lang="en-US" smtClean="0"/>
-              <a:t>1/14/2016</a:t>
+              <a:t>1/15/2016</a:t>
             </a:fld>
             <a:endParaRPr lang="en-US"/>
           </a:p>
@@ -3568,7 +3802,7 @@
           <a:p>
             <a:fld id="{F939DB40-1302-41AD-90AD-12D1D5337234}" type="datetimeFigureOut">
               <a:rPr lang="en-US" smtClean="0"/>
-              <a:t>1/14/2016</a:t>
+              <a:t>1/15/2016</a:t>
             </a:fld>
             <a:endParaRPr lang="en-US"/>
           </a:p>
@@ -3781,7 +4015,7 @@
           <a:p>
             <a:fld id="{F939DB40-1302-41AD-90AD-12D1D5337234}" type="datetimeFigureOut">
               <a:rPr lang="en-US" smtClean="0"/>
-              <a:t>1/14/2016</a:t>
+              <a:t>1/15/2016</a:t>
             </a:fld>
             <a:endParaRPr lang="en-US"/>
           </a:p>
@@ -4664,6 +4898,210 @@
     <p:extLst>
       <p:ext uri="{BB962C8B-B14F-4D97-AF65-F5344CB8AC3E}">
         <p14:creationId xmlns:p14="http://schemas.microsoft.com/office/powerpoint/2010/main" val="3385496374"/>
+      </p:ext>
+    </p:extLst>
+  </p:cSld>
+  <p:clrMapOvr>
+    <a:masterClrMapping/>
+  </p:clrMapOvr>
+  <p:transition spd="slow">
+    <p:push dir="u"/>
+  </p:transition>
+  <p:timing>
+    <p:tnLst>
+      <p:par>
+        <p:cTn id="1" dur="indefinite" restart="never" nodeType="tmRoot"/>
+      </p:par>
+    </p:tnLst>
+  </p:timing>
+</p:sld>
+</file>
+
+<file path=ppt/slides/slide14.xml><?xml version="1.0" encoding="utf-8"?>
+<p:sld xmlns:a="http://schemas.openxmlformats.org/drawingml/2006/main" xmlns:r="http://schemas.openxmlformats.org/officeDocument/2006/relationships" xmlns:p="http://schemas.openxmlformats.org/presentationml/2006/main">
+  <p:cSld>
+    <p:spTree>
+      <p:nvGrpSpPr>
+        <p:cNvPr id="1" name=""/>
+        <p:cNvGrpSpPr/>
+        <p:nvPr/>
+      </p:nvGrpSpPr>
+      <p:grpSpPr>
+        <a:xfrm>
+          <a:off x="0" y="0"/>
+          <a:ext cx="0" cy="0"/>
+          <a:chOff x="0" y="0"/>
+          <a:chExt cx="0" cy="0"/>
+        </a:xfrm>
+      </p:grpSpPr>
+      <p:sp>
+        <p:nvSpPr>
+          <p:cNvPr id="4" name="Tijdelijke aanduiding voor inhoud 3"/>
+          <p:cNvSpPr>
+            <a:spLocks noGrp="1"/>
+          </p:cNvSpPr>
+          <p:nvPr>
+            <p:ph idx="1"/>
+          </p:nvPr>
+        </p:nvSpPr>
+        <p:spPr/>
+        <p:txBody>
+          <a:bodyPr/>
+          <a:lstStyle/>
+          <a:p>
+            <a:endParaRPr lang="en-US"/>
+          </a:p>
+        </p:txBody>
+      </p:sp>
+      <p:sp>
+        <p:nvSpPr>
+          <p:cNvPr id="5" name="Titel 4"/>
+          <p:cNvSpPr>
+            <a:spLocks noGrp="1"/>
+          </p:cNvSpPr>
+          <p:nvPr>
+            <p:ph type="title"/>
+          </p:nvPr>
+        </p:nvSpPr>
+        <p:spPr/>
+        <p:txBody>
+          <a:bodyPr/>
+          <a:lstStyle/>
+          <a:p>
+            <a:endParaRPr lang="en-US"/>
+          </a:p>
+        </p:txBody>
+      </p:sp>
+      <p:pic>
+        <p:nvPicPr>
+          <p:cNvPr id="2" name="Afbeelding 1"/>
+          <p:cNvPicPr>
+            <a:picLocks noChangeAspect="1"/>
+          </p:cNvPicPr>
+          <p:nvPr/>
+        </p:nvPicPr>
+        <p:blipFill>
+          <a:blip r:embed="rId3"/>
+          <a:stretch>
+            <a:fillRect/>
+          </a:stretch>
+        </p:blipFill>
+        <p:spPr>
+          <a:xfrm>
+            <a:off x="2234095" y="365125"/>
+            <a:ext cx="7723809" cy="5811838"/>
+          </a:xfrm>
+          <a:prstGeom prst="rect">
+            <a:avLst/>
+          </a:prstGeom>
+        </p:spPr>
+      </p:pic>
+    </p:spTree>
+    <p:extLst>
+      <p:ext uri="{BB962C8B-B14F-4D97-AF65-F5344CB8AC3E}">
+        <p14:creationId xmlns:p14="http://schemas.microsoft.com/office/powerpoint/2010/main" val="841837128"/>
+      </p:ext>
+    </p:extLst>
+  </p:cSld>
+  <p:clrMapOvr>
+    <a:masterClrMapping/>
+  </p:clrMapOvr>
+  <p:transition spd="slow">
+    <p:push dir="u"/>
+  </p:transition>
+  <p:timing>
+    <p:tnLst>
+      <p:par>
+        <p:cTn id="1" dur="indefinite" restart="never" nodeType="tmRoot"/>
+      </p:par>
+    </p:tnLst>
+  </p:timing>
+</p:sld>
+</file>
+
+<file path=ppt/slides/slide15.xml><?xml version="1.0" encoding="utf-8"?>
+<p:sld xmlns:a="http://schemas.openxmlformats.org/drawingml/2006/main" xmlns:r="http://schemas.openxmlformats.org/officeDocument/2006/relationships" xmlns:p="http://schemas.openxmlformats.org/presentationml/2006/main">
+  <p:cSld>
+    <p:spTree>
+      <p:nvGrpSpPr>
+        <p:cNvPr id="1" name=""/>
+        <p:cNvGrpSpPr/>
+        <p:nvPr/>
+      </p:nvGrpSpPr>
+      <p:grpSpPr>
+        <a:xfrm>
+          <a:off x="0" y="0"/>
+          <a:ext cx="0" cy="0"/>
+          <a:chOff x="0" y="0"/>
+          <a:chExt cx="0" cy="0"/>
+        </a:xfrm>
+      </p:grpSpPr>
+      <p:sp>
+        <p:nvSpPr>
+          <p:cNvPr id="4" name="Tijdelijke aanduiding voor inhoud 3"/>
+          <p:cNvSpPr>
+            <a:spLocks noGrp="1"/>
+          </p:cNvSpPr>
+          <p:nvPr>
+            <p:ph idx="1"/>
+          </p:nvPr>
+        </p:nvSpPr>
+        <p:spPr/>
+        <p:txBody>
+          <a:bodyPr/>
+          <a:lstStyle/>
+          <a:p>
+            <a:endParaRPr lang="en-US"/>
+          </a:p>
+        </p:txBody>
+      </p:sp>
+      <p:sp>
+        <p:nvSpPr>
+          <p:cNvPr id="5" name="Titel 4"/>
+          <p:cNvSpPr>
+            <a:spLocks noGrp="1"/>
+          </p:cNvSpPr>
+          <p:nvPr>
+            <p:ph type="title"/>
+          </p:nvPr>
+        </p:nvSpPr>
+        <p:spPr/>
+        <p:txBody>
+          <a:bodyPr/>
+          <a:lstStyle/>
+          <a:p>
+            <a:endParaRPr lang="en-US"/>
+          </a:p>
+        </p:txBody>
+      </p:sp>
+      <p:pic>
+        <p:nvPicPr>
+          <p:cNvPr id="6" name="Afbeelding 5"/>
+          <p:cNvPicPr>
+            <a:picLocks noChangeAspect="1"/>
+          </p:cNvPicPr>
+          <p:nvPr/>
+        </p:nvPicPr>
+        <p:blipFill>
+          <a:blip r:embed="rId3"/>
+          <a:stretch>
+            <a:fillRect/>
+          </a:stretch>
+        </p:blipFill>
+        <p:spPr>
+          <a:xfrm>
+            <a:off x="1476375" y="365125"/>
+            <a:ext cx="9239250" cy="5862468"/>
+          </a:xfrm>
+          <a:prstGeom prst="rect">
+            <a:avLst/>
+          </a:prstGeom>
+        </p:spPr>
+      </p:pic>
+    </p:spTree>
+    <p:extLst>
+      <p:ext uri="{BB962C8B-B14F-4D97-AF65-F5344CB8AC3E}">
+        <p14:creationId xmlns:p14="http://schemas.microsoft.com/office/powerpoint/2010/main" val="1277378912"/>
       </p:ext>
     </p:extLst>
   </p:cSld>

</xml_diff>